<commit_message>
Update from 11.03.2024 number 4
</commit_message>
<xml_diff>
--- a/Third-Year/GK+Wi/Wi/2024.03.11/Prüfungsvorbereitung in Wirtschaft__SuS Variante.pptx
+++ b/Third-Year/GK+Wi/Wi/2024.03.11/Prüfungsvorbereitung in Wirtschaft__SuS Variante.pptx
@@ -7579,13 +7579,8 @@
           <a:p>
             <a:r>
               <a:rPr lang="de-DE" dirty="0"/>
-              <a:t>Das ganze gilt auch für die umgekehrten Fall mit </a:t>
-            </a:r>
-            <a:r>
-              <a:rPr lang="de-DE"/>
-              <a:t>den Nachfragern </a:t>
-            </a:r>
-            <a:endParaRPr lang="de-DE" dirty="0"/>
+              <a:t>Das ganze gilt auch für die umgekehrten Fall mit den Nachfragern </a:t>
+            </a:r>
           </a:p>
         </p:txBody>
       </p:sp>

</xml_diff>